<commit_message>
Update Proiect de software pentru telecomunicații- (1) (1).pptx
</commit_message>
<xml_diff>
--- a/farmacie/Proiect de software pentru telecomunicații- (1) (1).pptx
+++ b/farmacie/Proiect de software pentru telecomunicații- (1) (1).pptx
@@ -4737,6 +4737,31 @@
                 </a:highlight>
               </a:rPr>
               <a:t>Le vom prezenta in timpul sustinerii colocviului!</a:t>
+            </a:r>
+          </a:p>
+          <a:p>
+            <a:endParaRPr lang="ro-RO" dirty="0">
+              <a:highlight>
+                <a:srgbClr val="008080"/>
+              </a:highlight>
+            </a:endParaRPr>
+          </a:p>
+          <a:p>
+            <a:endParaRPr lang="ro-RO" dirty="0">
+              <a:highlight>
+                <a:srgbClr val="008080"/>
+              </a:highlight>
+            </a:endParaRPr>
+          </a:p>
+          <a:p>
+            <a:r>
+              <a:rPr lang="ro-RO" dirty="0">
+                <a:highlight>
+                  <a:srgbClr val="008080"/>
+                </a:highlight>
+                <a:hlinkClick r:id="rId2"/>
+              </a:rPr>
+              <a:t>Github link</a:t>
             </a:r>
             <a:endParaRPr lang="en-US" dirty="0">
               <a:highlight>

</xml_diff>